<commit_message>
Modify format (Dev. Guide)
</commit_message>
<xml_diff>
--- a/wiki_files/NEXCORE UML Modeler_Developer Guide.pptx
+++ b/wiki_files/NEXCORE UML Modeler_Developer Guide.pptx
@@ -22,6 +22,7 @@
     <p:sldId id="268" r:id="rId16"/>
     <p:sldId id="269" r:id="rId17"/>
     <p:sldId id="270" r:id="rId18"/>
+    <p:sldId id="273" r:id="rId19"/>
   </p:sldIdLst>
   <p:sldSz cx="9144000" cy="6858000" type="screen4x3"/>
   <p:notesSz cx="6858000" cy="9144000"/>
@@ -124,7 +125,7 @@
 </file>
 
 <file path=ppt/slideLayouts/slideLayout1.xml><?xml version="1.0" encoding="utf-8"?>
-<p:sldLayout xmlns:a="http://schemas.openxmlformats.org/drawingml/2006/main" xmlns:r="http://schemas.openxmlformats.org/officeDocument/2006/relationships" xmlns:p="http://schemas.openxmlformats.org/presentationml/2006/main" type="title" preserve="1">
+<p:sldLayout xmlns:a="http://schemas.openxmlformats.org/drawingml/2006/main" xmlns:r="http://schemas.openxmlformats.org/officeDocument/2006/relationships" xmlns:p="http://schemas.openxmlformats.org/presentationml/2006/main" preserve="1" userDrawn="1">
   <p:cSld name="제목 슬라이드">
     <p:spTree>
       <p:nvGrpSpPr>
@@ -140,218 +141,6 @@
           <a:chExt cx="0" cy="0"/>
         </a:xfrm>
       </p:grpSpPr>
-      <p:sp>
-        <p:nvSpPr>
-          <p:cNvPr id="2" name="제목 1"/>
-          <p:cNvSpPr>
-            <a:spLocks noGrp="1"/>
-          </p:cNvSpPr>
-          <p:nvPr>
-            <p:ph type="ctrTitle"/>
-          </p:nvPr>
-        </p:nvSpPr>
-        <p:spPr>
-          <a:xfrm>
-            <a:off x="685800" y="2130425"/>
-            <a:ext cx="7772400" cy="1470025"/>
-          </a:xfrm>
-        </p:spPr>
-        <p:txBody>
-          <a:bodyPr/>
-          <a:lstStyle/>
-          <a:p>
-            <a:r>
-              <a:rPr lang="ko-KR" altLang="en-US" smtClean="0"/>
-              <a:t>마스터 제목 스타일 편집</a:t>
-            </a:r>
-            <a:endParaRPr lang="ko-KR" altLang="en-US"/>
-          </a:p>
-        </p:txBody>
-      </p:sp>
-      <p:sp>
-        <p:nvSpPr>
-          <p:cNvPr id="3" name="부제목 2"/>
-          <p:cNvSpPr>
-            <a:spLocks noGrp="1"/>
-          </p:cNvSpPr>
-          <p:nvPr>
-            <p:ph type="subTitle" idx="1"/>
-          </p:nvPr>
-        </p:nvSpPr>
-        <p:spPr>
-          <a:xfrm>
-            <a:off x="1371600" y="3886200"/>
-            <a:ext cx="6400800" cy="1752600"/>
-          </a:xfrm>
-        </p:spPr>
-        <p:txBody>
-          <a:bodyPr/>
-          <a:lstStyle>
-            <a:lvl1pPr marL="0" indent="0" algn="ctr">
-              <a:buNone/>
-              <a:defRPr>
-                <a:solidFill>
-                  <a:schemeClr val="tx1">
-                    <a:tint val="75000"/>
-                  </a:schemeClr>
-                </a:solidFill>
-              </a:defRPr>
-            </a:lvl1pPr>
-            <a:lvl2pPr marL="457200" indent="0" algn="ctr">
-              <a:buNone/>
-              <a:defRPr>
-                <a:solidFill>
-                  <a:schemeClr val="tx1">
-                    <a:tint val="75000"/>
-                  </a:schemeClr>
-                </a:solidFill>
-              </a:defRPr>
-            </a:lvl2pPr>
-            <a:lvl3pPr marL="914400" indent="0" algn="ctr">
-              <a:buNone/>
-              <a:defRPr>
-                <a:solidFill>
-                  <a:schemeClr val="tx1">
-                    <a:tint val="75000"/>
-                  </a:schemeClr>
-                </a:solidFill>
-              </a:defRPr>
-            </a:lvl3pPr>
-            <a:lvl4pPr marL="1371600" indent="0" algn="ctr">
-              <a:buNone/>
-              <a:defRPr>
-                <a:solidFill>
-                  <a:schemeClr val="tx1">
-                    <a:tint val="75000"/>
-                  </a:schemeClr>
-                </a:solidFill>
-              </a:defRPr>
-            </a:lvl4pPr>
-            <a:lvl5pPr marL="1828800" indent="0" algn="ctr">
-              <a:buNone/>
-              <a:defRPr>
-                <a:solidFill>
-                  <a:schemeClr val="tx1">
-                    <a:tint val="75000"/>
-                  </a:schemeClr>
-                </a:solidFill>
-              </a:defRPr>
-            </a:lvl5pPr>
-            <a:lvl6pPr marL="2286000" indent="0" algn="ctr">
-              <a:buNone/>
-              <a:defRPr>
-                <a:solidFill>
-                  <a:schemeClr val="tx1">
-                    <a:tint val="75000"/>
-                  </a:schemeClr>
-                </a:solidFill>
-              </a:defRPr>
-            </a:lvl6pPr>
-            <a:lvl7pPr marL="2743200" indent="0" algn="ctr">
-              <a:buNone/>
-              <a:defRPr>
-                <a:solidFill>
-                  <a:schemeClr val="tx1">
-                    <a:tint val="75000"/>
-                  </a:schemeClr>
-                </a:solidFill>
-              </a:defRPr>
-            </a:lvl7pPr>
-            <a:lvl8pPr marL="3200400" indent="0" algn="ctr">
-              <a:buNone/>
-              <a:defRPr>
-                <a:solidFill>
-                  <a:schemeClr val="tx1">
-                    <a:tint val="75000"/>
-                  </a:schemeClr>
-                </a:solidFill>
-              </a:defRPr>
-            </a:lvl8pPr>
-            <a:lvl9pPr marL="3657600" indent="0" algn="ctr">
-              <a:buNone/>
-              <a:defRPr>
-                <a:solidFill>
-                  <a:schemeClr val="tx1">
-                    <a:tint val="75000"/>
-                  </a:schemeClr>
-                </a:solidFill>
-              </a:defRPr>
-            </a:lvl9pPr>
-          </a:lstStyle>
-          <a:p>
-            <a:r>
-              <a:rPr lang="ko-KR" altLang="en-US" smtClean="0"/>
-              <a:t>마스터 부제목 스타일 편집</a:t>
-            </a:r>
-            <a:endParaRPr lang="ko-KR" altLang="en-US"/>
-          </a:p>
-        </p:txBody>
-      </p:sp>
-      <p:sp>
-        <p:nvSpPr>
-          <p:cNvPr id="4" name="날짜 개체 틀 3"/>
-          <p:cNvSpPr>
-            <a:spLocks noGrp="1"/>
-          </p:cNvSpPr>
-          <p:nvPr>
-            <p:ph type="dt" sz="half" idx="10"/>
-          </p:nvPr>
-        </p:nvSpPr>
-        <p:spPr/>
-        <p:txBody>
-          <a:bodyPr/>
-          <a:lstStyle/>
-          <a:p>
-            <a:fld id="{FC0BB165-67B2-486D-B3F5-D61F26111002}" type="datetimeFigureOut">
-              <a:rPr lang="ko-KR" altLang="en-US" smtClean="0"/>
-              <a:t>2015-10-19</a:t>
-            </a:fld>
-            <a:endParaRPr lang="ko-KR" altLang="en-US"/>
-          </a:p>
-        </p:txBody>
-      </p:sp>
-      <p:sp>
-        <p:nvSpPr>
-          <p:cNvPr id="5" name="바닥글 개체 틀 4"/>
-          <p:cNvSpPr>
-            <a:spLocks noGrp="1"/>
-          </p:cNvSpPr>
-          <p:nvPr>
-            <p:ph type="ftr" sz="quarter" idx="11"/>
-          </p:nvPr>
-        </p:nvSpPr>
-        <p:spPr/>
-        <p:txBody>
-          <a:bodyPr/>
-          <a:lstStyle/>
-          <a:p>
-            <a:endParaRPr lang="ko-KR" altLang="en-US"/>
-          </a:p>
-        </p:txBody>
-      </p:sp>
-      <p:sp>
-        <p:nvSpPr>
-          <p:cNvPr id="6" name="슬라이드 번호 개체 틀 5"/>
-          <p:cNvSpPr>
-            <a:spLocks noGrp="1"/>
-          </p:cNvSpPr>
-          <p:nvPr>
-            <p:ph type="sldNum" sz="quarter" idx="12"/>
-          </p:nvPr>
-        </p:nvSpPr>
-        <p:spPr/>
-        <p:txBody>
-          <a:bodyPr/>
-          <a:lstStyle/>
-          <a:p>
-            <a:fld id="{918A2AD5-0C1D-4E54-9AD7-906D6635C1ED}" type="slidenum">
-              <a:rPr lang="ko-KR" altLang="en-US" smtClean="0"/>
-              <a:t>‹#›</a:t>
-            </a:fld>
-            <a:endParaRPr lang="ko-KR" altLang="en-US"/>
-          </a:p>
-        </p:txBody>
-      </p:sp>
     </p:spTree>
     <p:extLst>
       <p:ext uri="{BB962C8B-B14F-4D97-AF65-F5344CB8AC3E}">
@@ -392,7 +181,15 @@
             <p:ph type="title"/>
           </p:nvPr>
         </p:nvSpPr>
-        <p:spPr/>
+        <p:spPr>
+          <a:xfrm>
+            <a:off x="457200" y="274638"/>
+            <a:ext cx="8229600" cy="1143000"/>
+          </a:xfrm>
+          <a:prstGeom prst="rect">
+            <a:avLst/>
+          </a:prstGeom>
+        </p:spPr>
         <p:txBody>
           <a:bodyPr/>
           <a:lstStyle/>
@@ -415,7 +212,15 @@
             <p:ph type="body" orient="vert" idx="1"/>
           </p:nvPr>
         </p:nvSpPr>
-        <p:spPr/>
+        <p:spPr>
+          <a:xfrm>
+            <a:off x="457200" y="1600200"/>
+            <a:ext cx="8229600" cy="4525963"/>
+          </a:xfrm>
+          <a:prstGeom prst="rect">
+            <a:avLst/>
+          </a:prstGeom>
+        </p:spPr>
         <p:txBody>
           <a:bodyPr vert="eaVert"/>
           <a:lstStyle/>
@@ -467,14 +272,22 @@
             <p:ph type="dt" sz="half" idx="10"/>
           </p:nvPr>
         </p:nvSpPr>
-        <p:spPr/>
+        <p:spPr>
+          <a:xfrm>
+            <a:off x="457200" y="6356350"/>
+            <a:ext cx="2133600" cy="365125"/>
+          </a:xfrm>
+          <a:prstGeom prst="rect">
+            <a:avLst/>
+          </a:prstGeom>
+        </p:spPr>
         <p:txBody>
           <a:bodyPr/>
           <a:lstStyle/>
           <a:p>
             <a:fld id="{FC0BB165-67B2-486D-B3F5-D61F26111002}" type="datetimeFigureOut">
               <a:rPr lang="ko-KR" altLang="en-US" smtClean="0"/>
-              <a:t>2015-10-19</a:t>
+              <a:t>2015-10-20</a:t>
             </a:fld>
             <a:endParaRPr lang="ko-KR" altLang="en-US"/>
           </a:p>
@@ -490,7 +303,15 @@
             <p:ph type="ftr" sz="quarter" idx="11"/>
           </p:nvPr>
         </p:nvSpPr>
-        <p:spPr/>
+        <p:spPr>
+          <a:xfrm>
+            <a:off x="3124200" y="6356350"/>
+            <a:ext cx="2895600" cy="365125"/>
+          </a:xfrm>
+          <a:prstGeom prst="rect">
+            <a:avLst/>
+          </a:prstGeom>
+        </p:spPr>
         <p:txBody>
           <a:bodyPr/>
           <a:lstStyle/>
@@ -509,7 +330,15 @@
             <p:ph type="sldNum" sz="quarter" idx="12"/>
           </p:nvPr>
         </p:nvSpPr>
-        <p:spPr/>
+        <p:spPr>
+          <a:xfrm>
+            <a:off x="6553200" y="6356350"/>
+            <a:ext cx="2133600" cy="365125"/>
+          </a:xfrm>
+          <a:prstGeom prst="rect">
+            <a:avLst/>
+          </a:prstGeom>
+        </p:spPr>
         <p:txBody>
           <a:bodyPr/>
           <a:lstStyle/>
@@ -567,6 +396,9 @@
             <a:off x="6629400" y="274638"/>
             <a:ext cx="2057400" cy="5851525"/>
           </a:xfrm>
+          <a:prstGeom prst="rect">
+            <a:avLst/>
+          </a:prstGeom>
         </p:spPr>
         <p:txBody>
           <a:bodyPr vert="eaVert"/>
@@ -595,6 +427,9 @@
             <a:off x="457200" y="274638"/>
             <a:ext cx="6019800" cy="5851525"/>
           </a:xfrm>
+          <a:prstGeom prst="rect">
+            <a:avLst/>
+          </a:prstGeom>
         </p:spPr>
         <p:txBody>
           <a:bodyPr vert="eaVert"/>
@@ -647,14 +482,22 @@
             <p:ph type="dt" sz="half" idx="10"/>
           </p:nvPr>
         </p:nvSpPr>
-        <p:spPr/>
+        <p:spPr>
+          <a:xfrm>
+            <a:off x="457200" y="6356350"/>
+            <a:ext cx="2133600" cy="365125"/>
+          </a:xfrm>
+          <a:prstGeom prst="rect">
+            <a:avLst/>
+          </a:prstGeom>
+        </p:spPr>
         <p:txBody>
           <a:bodyPr/>
           <a:lstStyle/>
           <a:p>
             <a:fld id="{FC0BB165-67B2-486D-B3F5-D61F26111002}" type="datetimeFigureOut">
               <a:rPr lang="ko-KR" altLang="en-US" smtClean="0"/>
-              <a:t>2015-10-19</a:t>
+              <a:t>2015-10-20</a:t>
             </a:fld>
             <a:endParaRPr lang="ko-KR" altLang="en-US"/>
           </a:p>
@@ -670,7 +513,15 @@
             <p:ph type="ftr" sz="quarter" idx="11"/>
           </p:nvPr>
         </p:nvSpPr>
-        <p:spPr/>
+        <p:spPr>
+          <a:xfrm>
+            <a:off x="3124200" y="6356350"/>
+            <a:ext cx="2895600" cy="365125"/>
+          </a:xfrm>
+          <a:prstGeom prst="rect">
+            <a:avLst/>
+          </a:prstGeom>
+        </p:spPr>
         <p:txBody>
           <a:bodyPr/>
           <a:lstStyle/>
@@ -689,7 +540,15 @@
             <p:ph type="sldNum" sz="quarter" idx="12"/>
           </p:nvPr>
         </p:nvSpPr>
-        <p:spPr/>
+        <p:spPr>
+          <a:xfrm>
+            <a:off x="6553200" y="6356350"/>
+            <a:ext cx="2133600" cy="365125"/>
+          </a:xfrm>
+          <a:prstGeom prst="rect">
+            <a:avLst/>
+          </a:prstGeom>
+        </p:spPr>
         <p:txBody>
           <a:bodyPr/>
           <a:lstStyle/>
@@ -716,7 +575,7 @@
 </file>
 
 <file path=ppt/slideLayouts/slideLayout2.xml><?xml version="1.0" encoding="utf-8"?>
-<p:sldLayout xmlns:a="http://schemas.openxmlformats.org/drawingml/2006/main" xmlns:r="http://schemas.openxmlformats.org/officeDocument/2006/relationships" xmlns:p="http://schemas.openxmlformats.org/presentationml/2006/main" type="obj" preserve="1">
+<p:sldLayout xmlns:a="http://schemas.openxmlformats.org/drawingml/2006/main" xmlns:r="http://schemas.openxmlformats.org/officeDocument/2006/relationships" xmlns:p="http://schemas.openxmlformats.org/presentationml/2006/main" preserve="1" userDrawn="1">
   <p:cSld name="제목 및 내용">
     <p:spTree>
       <p:nvGrpSpPr>
@@ -734,141 +593,78 @@
       </p:grpSpPr>
       <p:sp>
         <p:nvSpPr>
-          <p:cNvPr id="2" name="제목 1"/>
+          <p:cNvPr id="7" name="Rectangle 193"/>
           <p:cNvSpPr>
-            <a:spLocks noGrp="1"/>
+            <a:spLocks noChangeArrowheads="1"/>
           </p:cNvSpPr>
-          <p:nvPr>
-            <p:ph type="title"/>
-          </p:nvPr>
-        </p:nvSpPr>
-        <p:spPr/>
-        <p:txBody>
-          <a:bodyPr/>
-          <a:lstStyle/>
-          <a:p>
-            <a:r>
-              <a:rPr lang="ko-KR" altLang="en-US" smtClean="0"/>
-              <a:t>마스터 제목 스타일 편집</a:t>
-            </a:r>
-            <a:endParaRPr lang="ko-KR" altLang="en-US"/>
-          </a:p>
-        </p:txBody>
-      </p:sp>
-      <p:sp>
-        <p:nvSpPr>
-          <p:cNvPr id="3" name="내용 개체 틀 2"/>
-          <p:cNvSpPr>
-            <a:spLocks noGrp="1"/>
-          </p:cNvSpPr>
-          <p:nvPr>
-            <p:ph idx="1"/>
-          </p:nvPr>
-        </p:nvSpPr>
-        <p:spPr/>
-        <p:txBody>
-          <a:bodyPr/>
-          <a:lstStyle/>
-          <a:p>
-            <a:pPr lvl="0"/>
-            <a:r>
-              <a:rPr lang="ko-KR" altLang="en-US" smtClean="0"/>
-              <a:t>마스터 텍스트 스타일을 편집합니다</a:t>
-            </a:r>
-          </a:p>
-          <a:p>
-            <a:pPr lvl="1"/>
-            <a:r>
-              <a:rPr lang="ko-KR" altLang="en-US" smtClean="0"/>
-              <a:t>둘째 수준</a:t>
-            </a:r>
-          </a:p>
-          <a:p>
-            <a:pPr lvl="2"/>
-            <a:r>
-              <a:rPr lang="ko-KR" altLang="en-US" smtClean="0"/>
-              <a:t>셋째 수준</a:t>
-            </a:r>
-          </a:p>
-          <a:p>
-            <a:pPr lvl="3"/>
-            <a:r>
-              <a:rPr lang="ko-KR" altLang="en-US" smtClean="0"/>
-              <a:t>넷째 수준</a:t>
-            </a:r>
-          </a:p>
-          <a:p>
-            <a:pPr lvl="4"/>
-            <a:r>
-              <a:rPr lang="ko-KR" altLang="en-US" smtClean="0"/>
-              <a:t>다섯째 수준</a:t>
-            </a:r>
-            <a:endParaRPr lang="ko-KR" altLang="en-US"/>
-          </a:p>
-        </p:txBody>
-      </p:sp>
-      <p:sp>
-        <p:nvSpPr>
-          <p:cNvPr id="4" name="날짜 개체 틀 3"/>
-          <p:cNvSpPr>
-            <a:spLocks noGrp="1"/>
-          </p:cNvSpPr>
-          <p:nvPr>
-            <p:ph type="dt" sz="half" idx="10"/>
-          </p:nvPr>
-        </p:nvSpPr>
-        <p:spPr/>
-        <p:txBody>
-          <a:bodyPr/>
-          <a:lstStyle/>
-          <a:p>
-            <a:fld id="{FC0BB165-67B2-486D-B3F5-D61F26111002}" type="datetimeFigureOut">
-              <a:rPr lang="ko-KR" altLang="en-US" smtClean="0"/>
-              <a:t>2015-10-19</a:t>
-            </a:fld>
-            <a:endParaRPr lang="ko-KR" altLang="en-US"/>
-          </a:p>
-        </p:txBody>
-      </p:sp>
-      <p:sp>
-        <p:nvSpPr>
-          <p:cNvPr id="5" name="바닥글 개체 틀 4"/>
-          <p:cNvSpPr>
-            <a:spLocks noGrp="1"/>
-          </p:cNvSpPr>
-          <p:nvPr>
-            <p:ph type="ftr" sz="quarter" idx="11"/>
-          </p:nvPr>
-        </p:nvSpPr>
-        <p:spPr/>
-        <p:txBody>
-          <a:bodyPr/>
-          <a:lstStyle/>
-          <a:p>
-            <a:endParaRPr lang="ko-KR" altLang="en-US"/>
-          </a:p>
-        </p:txBody>
-      </p:sp>
-      <p:sp>
-        <p:nvSpPr>
-          <p:cNvPr id="6" name="슬라이드 번호 개체 틀 5"/>
-          <p:cNvSpPr>
-            <a:spLocks noGrp="1"/>
-          </p:cNvSpPr>
-          <p:nvPr>
-            <p:ph type="sldNum" sz="quarter" idx="12"/>
-          </p:nvPr>
-        </p:nvSpPr>
-        <p:spPr/>
-        <p:txBody>
-          <a:bodyPr/>
-          <a:lstStyle/>
-          <a:p>
-            <a:fld id="{918A2AD5-0C1D-4E54-9AD7-906D6635C1ED}" type="slidenum">
-              <a:rPr lang="ko-KR" altLang="en-US" smtClean="0"/>
+          <p:nvPr userDrawn="1"/>
+        </p:nvSpPr>
+        <p:spPr bwMode="auto">
+          <a:xfrm>
+            <a:off x="4283968" y="6597352"/>
+            <a:ext cx="445635" cy="169277"/>
+          </a:xfrm>
+          <a:prstGeom prst="rect">
+            <a:avLst/>
+          </a:prstGeom>
+          <a:noFill/>
+          <a:ln w="12700">
+            <a:noFill/>
+            <a:miter lim="800000"/>
+            <a:headEnd/>
+            <a:tailEnd/>
+          </a:ln>
+          <a:effectLst/>
+        </p:spPr>
+        <p:txBody>
+          <a:bodyPr wrap="none" lIns="0" tIns="0" rIns="0" bIns="0" anchor="ctr">
+            <a:spAutoFit/>
+          </a:bodyPr>
+          <a:lstStyle/>
+          <a:p>
+            <a:pPr algn="r" eaLnBrk="0" latinLnBrk="0" hangingPunct="0">
+              <a:defRPr/>
+            </a:pPr>
+            <a:r>
+              <a:rPr kumimoji="0" lang="en-US" altLang="ko-KR" sz="1100" b="1" dirty="0">
+                <a:solidFill>
+                  <a:schemeClr val="tx1"/>
+                </a:solidFill>
+                <a:latin typeface="맑은 고딕" pitchFamily="50" charset="-127"/>
+                <a:ea typeface="맑은 고딕" pitchFamily="50" charset="-127"/>
+              </a:rPr>
+              <a:t>- </a:t>
+            </a:r>
+            <a:fld id="{26423138-36DE-4DFF-9609-F7A1FA1241FF}" type="slidenum">
+              <a:rPr kumimoji="0" lang="ko-KR" altLang="en-US" sz="1100" b="1">
+                <a:solidFill>
+                  <a:schemeClr val="tx1"/>
+                </a:solidFill>
+                <a:latin typeface="맑은 고딕" pitchFamily="50" charset="-127"/>
+                <a:ea typeface="맑은 고딕" pitchFamily="50" charset="-127"/>
+              </a:rPr>
+              <a:pPr algn="r" eaLnBrk="0" latinLnBrk="0" hangingPunct="0">
+                <a:defRPr/>
+              </a:pPr>
               <a:t>‹#›</a:t>
             </a:fld>
-            <a:endParaRPr lang="ko-KR" altLang="en-US"/>
+            <a:r>
+              <a:rPr kumimoji="0" lang="en-US" altLang="ko-KR" sz="1100" b="1" dirty="0">
+                <a:solidFill>
+                  <a:schemeClr val="tx1"/>
+                </a:solidFill>
+                <a:latin typeface="맑은 고딕" pitchFamily="50" charset="-127"/>
+                <a:ea typeface="맑은 고딕" pitchFamily="50" charset="-127"/>
+              </a:rPr>
+              <a:t> - </a:t>
+            </a:r>
+            <a:endParaRPr kumimoji="0" lang="ko-KR" altLang="en-US" sz="1100" b="1" dirty="0">
+              <a:solidFill>
+                <a:schemeClr val="tx1"/>
+              </a:solidFill>
+              <a:latin typeface="맑은 고딕" pitchFamily="50" charset="-127"/>
+              <a:ea typeface="맑은 고딕" pitchFamily="50" charset="-127"/>
+            </a:endParaRPr>
           </a:p>
         </p:txBody>
       </p:sp>
@@ -917,6 +713,9 @@
             <a:off x="722313" y="4406900"/>
             <a:ext cx="7772400" cy="1362075"/>
           </a:xfrm>
+          <a:prstGeom prst="rect">
+            <a:avLst/>
+          </a:prstGeom>
         </p:spPr>
         <p:txBody>
           <a:bodyPr anchor="t"/>
@@ -949,6 +748,9 @@
             <a:off x="722313" y="2906713"/>
             <a:ext cx="7772400" cy="1500187"/>
           </a:xfrm>
+          <a:prstGeom prst="rect">
+            <a:avLst/>
+          </a:prstGeom>
         </p:spPr>
         <p:txBody>
           <a:bodyPr anchor="b"/>
@@ -1063,14 +865,22 @@
             <p:ph type="dt" sz="half" idx="10"/>
           </p:nvPr>
         </p:nvSpPr>
-        <p:spPr/>
+        <p:spPr>
+          <a:xfrm>
+            <a:off x="457200" y="6356350"/>
+            <a:ext cx="2133600" cy="365125"/>
+          </a:xfrm>
+          <a:prstGeom prst="rect">
+            <a:avLst/>
+          </a:prstGeom>
+        </p:spPr>
         <p:txBody>
           <a:bodyPr/>
           <a:lstStyle/>
           <a:p>
             <a:fld id="{FC0BB165-67B2-486D-B3F5-D61F26111002}" type="datetimeFigureOut">
               <a:rPr lang="ko-KR" altLang="en-US" smtClean="0"/>
-              <a:t>2015-10-19</a:t>
+              <a:t>2015-10-20</a:t>
             </a:fld>
             <a:endParaRPr lang="ko-KR" altLang="en-US"/>
           </a:p>
@@ -1086,7 +896,15 @@
             <p:ph type="ftr" sz="quarter" idx="11"/>
           </p:nvPr>
         </p:nvSpPr>
-        <p:spPr/>
+        <p:spPr>
+          <a:xfrm>
+            <a:off x="3124200" y="6356350"/>
+            <a:ext cx="2895600" cy="365125"/>
+          </a:xfrm>
+          <a:prstGeom prst="rect">
+            <a:avLst/>
+          </a:prstGeom>
+        </p:spPr>
         <p:txBody>
           <a:bodyPr/>
           <a:lstStyle/>
@@ -1105,7 +923,15 @@
             <p:ph type="sldNum" sz="quarter" idx="12"/>
           </p:nvPr>
         </p:nvSpPr>
-        <p:spPr/>
+        <p:spPr>
+          <a:xfrm>
+            <a:off x="6553200" y="6356350"/>
+            <a:ext cx="2133600" cy="365125"/>
+          </a:xfrm>
+          <a:prstGeom prst="rect">
+            <a:avLst/>
+          </a:prstGeom>
+        </p:spPr>
         <p:txBody>
           <a:bodyPr/>
           <a:lstStyle/>
@@ -1158,7 +984,15 @@
             <p:ph type="title"/>
           </p:nvPr>
         </p:nvSpPr>
-        <p:spPr/>
+        <p:spPr>
+          <a:xfrm>
+            <a:off x="457200" y="274638"/>
+            <a:ext cx="8229600" cy="1143000"/>
+          </a:xfrm>
+          <a:prstGeom prst="rect">
+            <a:avLst/>
+          </a:prstGeom>
+        </p:spPr>
         <p:txBody>
           <a:bodyPr/>
           <a:lstStyle/>
@@ -1186,6 +1020,9 @@
             <a:off x="457200" y="1600200"/>
             <a:ext cx="4038600" cy="4525963"/>
           </a:xfrm>
+          <a:prstGeom prst="rect">
+            <a:avLst/>
+          </a:prstGeom>
         </p:spPr>
         <p:txBody>
           <a:bodyPr/>
@@ -1271,6 +1108,9 @@
             <a:off x="4648200" y="1600200"/>
             <a:ext cx="4038600" cy="4525963"/>
           </a:xfrm>
+          <a:prstGeom prst="rect">
+            <a:avLst/>
+          </a:prstGeom>
         </p:spPr>
         <p:txBody>
           <a:bodyPr/>
@@ -1351,14 +1191,22 @@
             <p:ph type="dt" sz="half" idx="10"/>
           </p:nvPr>
         </p:nvSpPr>
-        <p:spPr/>
+        <p:spPr>
+          <a:xfrm>
+            <a:off x="457200" y="6356350"/>
+            <a:ext cx="2133600" cy="365125"/>
+          </a:xfrm>
+          <a:prstGeom prst="rect">
+            <a:avLst/>
+          </a:prstGeom>
+        </p:spPr>
         <p:txBody>
           <a:bodyPr/>
           <a:lstStyle/>
           <a:p>
             <a:fld id="{FC0BB165-67B2-486D-B3F5-D61F26111002}" type="datetimeFigureOut">
               <a:rPr lang="ko-KR" altLang="en-US" smtClean="0"/>
-              <a:t>2015-10-19</a:t>
+              <a:t>2015-10-20</a:t>
             </a:fld>
             <a:endParaRPr lang="ko-KR" altLang="en-US"/>
           </a:p>
@@ -1374,7 +1222,15 @@
             <p:ph type="ftr" sz="quarter" idx="11"/>
           </p:nvPr>
         </p:nvSpPr>
-        <p:spPr/>
+        <p:spPr>
+          <a:xfrm>
+            <a:off x="3124200" y="6356350"/>
+            <a:ext cx="2895600" cy="365125"/>
+          </a:xfrm>
+          <a:prstGeom prst="rect">
+            <a:avLst/>
+          </a:prstGeom>
+        </p:spPr>
         <p:txBody>
           <a:bodyPr/>
           <a:lstStyle/>
@@ -1393,7 +1249,15 @@
             <p:ph type="sldNum" sz="quarter" idx="12"/>
           </p:nvPr>
         </p:nvSpPr>
-        <p:spPr/>
+        <p:spPr>
+          <a:xfrm>
+            <a:off x="6553200" y="6356350"/>
+            <a:ext cx="2133600" cy="365125"/>
+          </a:xfrm>
+          <a:prstGeom prst="rect">
+            <a:avLst/>
+          </a:prstGeom>
+        </p:spPr>
         <p:txBody>
           <a:bodyPr/>
           <a:lstStyle/>
@@ -1446,7 +1310,15 @@
             <p:ph type="title"/>
           </p:nvPr>
         </p:nvSpPr>
-        <p:spPr/>
+        <p:spPr>
+          <a:xfrm>
+            <a:off x="457200" y="274638"/>
+            <a:ext cx="8229600" cy="1143000"/>
+          </a:xfrm>
+          <a:prstGeom prst="rect">
+            <a:avLst/>
+          </a:prstGeom>
+        </p:spPr>
         <p:txBody>
           <a:bodyPr/>
           <a:lstStyle>
@@ -1478,6 +1350,9 @@
             <a:off x="457200" y="1535113"/>
             <a:ext cx="4040188" cy="639762"/>
           </a:xfrm>
+          <a:prstGeom prst="rect">
+            <a:avLst/>
+          </a:prstGeom>
         </p:spPr>
         <p:txBody>
           <a:bodyPr anchor="b"/>
@@ -1543,6 +1418,9 @@
             <a:off x="457200" y="2174875"/>
             <a:ext cx="4040188" cy="3951288"/>
           </a:xfrm>
+          <a:prstGeom prst="rect">
+            <a:avLst/>
+          </a:prstGeom>
         </p:spPr>
         <p:txBody>
           <a:bodyPr/>
@@ -1628,6 +1506,9 @@
             <a:off x="4645025" y="1535113"/>
             <a:ext cx="4041775" cy="639762"/>
           </a:xfrm>
+          <a:prstGeom prst="rect">
+            <a:avLst/>
+          </a:prstGeom>
         </p:spPr>
         <p:txBody>
           <a:bodyPr anchor="b"/>
@@ -1693,6 +1574,9 @@
             <a:off x="4645025" y="2174875"/>
             <a:ext cx="4041775" cy="3951288"/>
           </a:xfrm>
+          <a:prstGeom prst="rect">
+            <a:avLst/>
+          </a:prstGeom>
         </p:spPr>
         <p:txBody>
           <a:bodyPr/>
@@ -1773,14 +1657,22 @@
             <p:ph type="dt" sz="half" idx="10"/>
           </p:nvPr>
         </p:nvSpPr>
-        <p:spPr/>
+        <p:spPr>
+          <a:xfrm>
+            <a:off x="457200" y="6356350"/>
+            <a:ext cx="2133600" cy="365125"/>
+          </a:xfrm>
+          <a:prstGeom prst="rect">
+            <a:avLst/>
+          </a:prstGeom>
+        </p:spPr>
         <p:txBody>
           <a:bodyPr/>
           <a:lstStyle/>
           <a:p>
             <a:fld id="{FC0BB165-67B2-486D-B3F5-D61F26111002}" type="datetimeFigureOut">
               <a:rPr lang="ko-KR" altLang="en-US" smtClean="0"/>
-              <a:t>2015-10-19</a:t>
+              <a:t>2015-10-20</a:t>
             </a:fld>
             <a:endParaRPr lang="ko-KR" altLang="en-US"/>
           </a:p>
@@ -1796,7 +1688,15 @@
             <p:ph type="ftr" sz="quarter" idx="11"/>
           </p:nvPr>
         </p:nvSpPr>
-        <p:spPr/>
+        <p:spPr>
+          <a:xfrm>
+            <a:off x="3124200" y="6356350"/>
+            <a:ext cx="2895600" cy="365125"/>
+          </a:xfrm>
+          <a:prstGeom prst="rect">
+            <a:avLst/>
+          </a:prstGeom>
+        </p:spPr>
         <p:txBody>
           <a:bodyPr/>
           <a:lstStyle/>
@@ -1815,7 +1715,15 @@
             <p:ph type="sldNum" sz="quarter" idx="12"/>
           </p:nvPr>
         </p:nvSpPr>
-        <p:spPr/>
+        <p:spPr>
+          <a:xfrm>
+            <a:off x="6553200" y="6356350"/>
+            <a:ext cx="2133600" cy="365125"/>
+          </a:xfrm>
+          <a:prstGeom prst="rect">
+            <a:avLst/>
+          </a:prstGeom>
+        </p:spPr>
         <p:txBody>
           <a:bodyPr/>
           <a:lstStyle/>
@@ -1868,7 +1776,15 @@
             <p:ph type="title"/>
           </p:nvPr>
         </p:nvSpPr>
-        <p:spPr/>
+        <p:spPr>
+          <a:xfrm>
+            <a:off x="457200" y="274638"/>
+            <a:ext cx="8229600" cy="1143000"/>
+          </a:xfrm>
+          <a:prstGeom prst="rect">
+            <a:avLst/>
+          </a:prstGeom>
+        </p:spPr>
         <p:txBody>
           <a:bodyPr/>
           <a:lstStyle/>
@@ -1891,14 +1807,22 @@
             <p:ph type="dt" sz="half" idx="10"/>
           </p:nvPr>
         </p:nvSpPr>
-        <p:spPr/>
+        <p:spPr>
+          <a:xfrm>
+            <a:off x="457200" y="6356350"/>
+            <a:ext cx="2133600" cy="365125"/>
+          </a:xfrm>
+          <a:prstGeom prst="rect">
+            <a:avLst/>
+          </a:prstGeom>
+        </p:spPr>
         <p:txBody>
           <a:bodyPr/>
           <a:lstStyle/>
           <a:p>
             <a:fld id="{FC0BB165-67B2-486D-B3F5-D61F26111002}" type="datetimeFigureOut">
               <a:rPr lang="ko-KR" altLang="en-US" smtClean="0"/>
-              <a:t>2015-10-19</a:t>
+              <a:t>2015-10-20</a:t>
             </a:fld>
             <a:endParaRPr lang="ko-KR" altLang="en-US"/>
           </a:p>
@@ -1914,7 +1838,15 @@
             <p:ph type="ftr" sz="quarter" idx="11"/>
           </p:nvPr>
         </p:nvSpPr>
-        <p:spPr/>
+        <p:spPr>
+          <a:xfrm>
+            <a:off x="3124200" y="6356350"/>
+            <a:ext cx="2895600" cy="365125"/>
+          </a:xfrm>
+          <a:prstGeom prst="rect">
+            <a:avLst/>
+          </a:prstGeom>
+        </p:spPr>
         <p:txBody>
           <a:bodyPr/>
           <a:lstStyle/>
@@ -1933,7 +1865,15 @@
             <p:ph type="sldNum" sz="quarter" idx="12"/>
           </p:nvPr>
         </p:nvSpPr>
-        <p:spPr/>
+        <p:spPr>
+          <a:xfrm>
+            <a:off x="6553200" y="6356350"/>
+            <a:ext cx="2133600" cy="365125"/>
+          </a:xfrm>
+          <a:prstGeom prst="rect">
+            <a:avLst/>
+          </a:prstGeom>
+        </p:spPr>
         <p:txBody>
           <a:bodyPr/>
           <a:lstStyle/>
@@ -1986,14 +1926,22 @@
             <p:ph type="dt" sz="half" idx="10"/>
           </p:nvPr>
         </p:nvSpPr>
-        <p:spPr/>
+        <p:spPr>
+          <a:xfrm>
+            <a:off x="457200" y="6356350"/>
+            <a:ext cx="2133600" cy="365125"/>
+          </a:xfrm>
+          <a:prstGeom prst="rect">
+            <a:avLst/>
+          </a:prstGeom>
+        </p:spPr>
         <p:txBody>
           <a:bodyPr/>
           <a:lstStyle/>
           <a:p>
             <a:fld id="{FC0BB165-67B2-486D-B3F5-D61F26111002}" type="datetimeFigureOut">
               <a:rPr lang="ko-KR" altLang="en-US" smtClean="0"/>
-              <a:t>2015-10-19</a:t>
+              <a:t>2015-10-20</a:t>
             </a:fld>
             <a:endParaRPr lang="ko-KR" altLang="en-US"/>
           </a:p>
@@ -2009,7 +1957,15 @@
             <p:ph type="ftr" sz="quarter" idx="11"/>
           </p:nvPr>
         </p:nvSpPr>
-        <p:spPr/>
+        <p:spPr>
+          <a:xfrm>
+            <a:off x="3124200" y="6356350"/>
+            <a:ext cx="2895600" cy="365125"/>
+          </a:xfrm>
+          <a:prstGeom prst="rect">
+            <a:avLst/>
+          </a:prstGeom>
+        </p:spPr>
         <p:txBody>
           <a:bodyPr/>
           <a:lstStyle/>
@@ -2028,7 +1984,15 @@
             <p:ph type="sldNum" sz="quarter" idx="12"/>
           </p:nvPr>
         </p:nvSpPr>
-        <p:spPr/>
+        <p:spPr>
+          <a:xfrm>
+            <a:off x="6553200" y="6356350"/>
+            <a:ext cx="2133600" cy="365125"/>
+          </a:xfrm>
+          <a:prstGeom prst="rect">
+            <a:avLst/>
+          </a:prstGeom>
+        </p:spPr>
         <p:txBody>
           <a:bodyPr/>
           <a:lstStyle/>
@@ -2086,6 +2050,9 @@
             <a:off x="457200" y="273050"/>
             <a:ext cx="3008313" cy="1162050"/>
           </a:xfrm>
+          <a:prstGeom prst="rect">
+            <a:avLst/>
+          </a:prstGeom>
         </p:spPr>
         <p:txBody>
           <a:bodyPr anchor="b"/>
@@ -2118,6 +2085,9 @@
             <a:off x="3575050" y="273050"/>
             <a:ext cx="5111750" cy="5853113"/>
           </a:xfrm>
+          <a:prstGeom prst="rect">
+            <a:avLst/>
+          </a:prstGeom>
         </p:spPr>
         <p:txBody>
           <a:bodyPr/>
@@ -2203,6 +2173,9 @@
             <a:off x="457200" y="1435100"/>
             <a:ext cx="3008313" cy="4691063"/>
           </a:xfrm>
+          <a:prstGeom prst="rect">
+            <a:avLst/>
+          </a:prstGeom>
         </p:spPr>
         <p:txBody>
           <a:bodyPr/>
@@ -2263,14 +2236,22 @@
             <p:ph type="dt" sz="half" idx="10"/>
           </p:nvPr>
         </p:nvSpPr>
-        <p:spPr/>
+        <p:spPr>
+          <a:xfrm>
+            <a:off x="457200" y="6356350"/>
+            <a:ext cx="2133600" cy="365125"/>
+          </a:xfrm>
+          <a:prstGeom prst="rect">
+            <a:avLst/>
+          </a:prstGeom>
+        </p:spPr>
         <p:txBody>
           <a:bodyPr/>
           <a:lstStyle/>
           <a:p>
             <a:fld id="{FC0BB165-67B2-486D-B3F5-D61F26111002}" type="datetimeFigureOut">
               <a:rPr lang="ko-KR" altLang="en-US" smtClean="0"/>
-              <a:t>2015-10-19</a:t>
+              <a:t>2015-10-20</a:t>
             </a:fld>
             <a:endParaRPr lang="ko-KR" altLang="en-US"/>
           </a:p>
@@ -2286,7 +2267,15 @@
             <p:ph type="ftr" sz="quarter" idx="11"/>
           </p:nvPr>
         </p:nvSpPr>
-        <p:spPr/>
+        <p:spPr>
+          <a:xfrm>
+            <a:off x="3124200" y="6356350"/>
+            <a:ext cx="2895600" cy="365125"/>
+          </a:xfrm>
+          <a:prstGeom prst="rect">
+            <a:avLst/>
+          </a:prstGeom>
+        </p:spPr>
         <p:txBody>
           <a:bodyPr/>
           <a:lstStyle/>
@@ -2305,7 +2294,15 @@
             <p:ph type="sldNum" sz="quarter" idx="12"/>
           </p:nvPr>
         </p:nvSpPr>
-        <p:spPr/>
+        <p:spPr>
+          <a:xfrm>
+            <a:off x="6553200" y="6356350"/>
+            <a:ext cx="2133600" cy="365125"/>
+          </a:xfrm>
+          <a:prstGeom prst="rect">
+            <a:avLst/>
+          </a:prstGeom>
+        </p:spPr>
         <p:txBody>
           <a:bodyPr/>
           <a:lstStyle/>
@@ -2363,6 +2360,9 @@
             <a:off x="1792288" y="4800600"/>
             <a:ext cx="5486400" cy="566738"/>
           </a:xfrm>
+          <a:prstGeom prst="rect">
+            <a:avLst/>
+          </a:prstGeom>
         </p:spPr>
         <p:txBody>
           <a:bodyPr anchor="b"/>
@@ -2395,6 +2395,9 @@
             <a:off x="1792288" y="612775"/>
             <a:ext cx="5486400" cy="4114800"/>
           </a:xfrm>
+          <a:prstGeom prst="rect">
+            <a:avLst/>
+          </a:prstGeom>
         </p:spPr>
         <p:txBody>
           <a:bodyPr/>
@@ -2456,6 +2459,9 @@
             <a:off x="1792288" y="5367338"/>
             <a:ext cx="5486400" cy="804862"/>
           </a:xfrm>
+          <a:prstGeom prst="rect">
+            <a:avLst/>
+          </a:prstGeom>
         </p:spPr>
         <p:txBody>
           <a:bodyPr/>
@@ -2516,14 +2522,22 @@
             <p:ph type="dt" sz="half" idx="10"/>
           </p:nvPr>
         </p:nvSpPr>
-        <p:spPr/>
+        <p:spPr>
+          <a:xfrm>
+            <a:off x="457200" y="6356350"/>
+            <a:ext cx="2133600" cy="365125"/>
+          </a:xfrm>
+          <a:prstGeom prst="rect">
+            <a:avLst/>
+          </a:prstGeom>
+        </p:spPr>
         <p:txBody>
           <a:bodyPr/>
           <a:lstStyle/>
           <a:p>
             <a:fld id="{FC0BB165-67B2-486D-B3F5-D61F26111002}" type="datetimeFigureOut">
               <a:rPr lang="ko-KR" altLang="en-US" smtClean="0"/>
-              <a:t>2015-10-19</a:t>
+              <a:t>2015-10-20</a:t>
             </a:fld>
             <a:endParaRPr lang="ko-KR" altLang="en-US"/>
           </a:p>
@@ -2539,7 +2553,15 @@
             <p:ph type="ftr" sz="quarter" idx="11"/>
           </p:nvPr>
         </p:nvSpPr>
-        <p:spPr/>
+        <p:spPr>
+          <a:xfrm>
+            <a:off x="3124200" y="6356350"/>
+            <a:ext cx="2895600" cy="365125"/>
+          </a:xfrm>
+          <a:prstGeom prst="rect">
+            <a:avLst/>
+          </a:prstGeom>
+        </p:spPr>
         <p:txBody>
           <a:bodyPr/>
           <a:lstStyle/>
@@ -2558,7 +2580,15 @@
             <p:ph type="sldNum" sz="quarter" idx="12"/>
           </p:nvPr>
         </p:nvSpPr>
-        <p:spPr/>
+        <p:spPr>
+          <a:xfrm>
+            <a:off x="6553200" y="6356350"/>
+            <a:ext cx="2133600" cy="365125"/>
+          </a:xfrm>
+          <a:prstGeom prst="rect">
+            <a:avLst/>
+          </a:prstGeom>
+        </p:spPr>
         <p:txBody>
           <a:bodyPr/>
           <a:lstStyle/>
@@ -2606,220 +2636,6 @@
           <a:chExt cx="0" cy="0"/>
         </a:xfrm>
       </p:grpSpPr>
-      <p:sp>
-        <p:nvSpPr>
-          <p:cNvPr id="2" name="제목 개체 틀 1"/>
-          <p:cNvSpPr>
-            <a:spLocks noGrp="1"/>
-          </p:cNvSpPr>
-          <p:nvPr>
-            <p:ph type="title"/>
-          </p:nvPr>
-        </p:nvSpPr>
-        <p:spPr>
-          <a:xfrm>
-            <a:off x="457200" y="274638"/>
-            <a:ext cx="8229600" cy="1143000"/>
-          </a:xfrm>
-          <a:prstGeom prst="rect">
-            <a:avLst/>
-          </a:prstGeom>
-        </p:spPr>
-        <p:txBody>
-          <a:bodyPr vert="horz" lIns="91440" tIns="45720" rIns="91440" bIns="45720" rtlCol="0" anchor="ctr">
-            <a:normAutofit/>
-          </a:bodyPr>
-          <a:lstStyle/>
-          <a:p>
-            <a:r>
-              <a:rPr lang="ko-KR" altLang="en-US" smtClean="0"/>
-              <a:t>마스터 제목 스타일 편집</a:t>
-            </a:r>
-            <a:endParaRPr lang="ko-KR" altLang="en-US"/>
-          </a:p>
-        </p:txBody>
-      </p:sp>
-      <p:sp>
-        <p:nvSpPr>
-          <p:cNvPr id="3" name="텍스트 개체 틀 2"/>
-          <p:cNvSpPr>
-            <a:spLocks noGrp="1"/>
-          </p:cNvSpPr>
-          <p:nvPr>
-            <p:ph type="body" idx="1"/>
-          </p:nvPr>
-        </p:nvSpPr>
-        <p:spPr>
-          <a:xfrm>
-            <a:off x="457200" y="1600200"/>
-            <a:ext cx="8229600" cy="4525963"/>
-          </a:xfrm>
-          <a:prstGeom prst="rect">
-            <a:avLst/>
-          </a:prstGeom>
-        </p:spPr>
-        <p:txBody>
-          <a:bodyPr vert="horz" lIns="91440" tIns="45720" rIns="91440" bIns="45720" rtlCol="0">
-            <a:normAutofit/>
-          </a:bodyPr>
-          <a:lstStyle/>
-          <a:p>
-            <a:pPr lvl="0"/>
-            <a:r>
-              <a:rPr lang="ko-KR" altLang="en-US" smtClean="0"/>
-              <a:t>마스터 텍스트 스타일을 편집합니다</a:t>
-            </a:r>
-          </a:p>
-          <a:p>
-            <a:pPr lvl="1"/>
-            <a:r>
-              <a:rPr lang="ko-KR" altLang="en-US" smtClean="0"/>
-              <a:t>둘째 수준</a:t>
-            </a:r>
-          </a:p>
-          <a:p>
-            <a:pPr lvl="2"/>
-            <a:r>
-              <a:rPr lang="ko-KR" altLang="en-US" smtClean="0"/>
-              <a:t>셋째 수준</a:t>
-            </a:r>
-          </a:p>
-          <a:p>
-            <a:pPr lvl="3"/>
-            <a:r>
-              <a:rPr lang="ko-KR" altLang="en-US" smtClean="0"/>
-              <a:t>넷째 수준</a:t>
-            </a:r>
-          </a:p>
-          <a:p>
-            <a:pPr lvl="4"/>
-            <a:r>
-              <a:rPr lang="ko-KR" altLang="en-US" smtClean="0"/>
-              <a:t>다섯째 수준</a:t>
-            </a:r>
-            <a:endParaRPr lang="ko-KR" altLang="en-US"/>
-          </a:p>
-        </p:txBody>
-      </p:sp>
-      <p:sp>
-        <p:nvSpPr>
-          <p:cNvPr id="4" name="날짜 개체 틀 3"/>
-          <p:cNvSpPr>
-            <a:spLocks noGrp="1"/>
-          </p:cNvSpPr>
-          <p:nvPr>
-            <p:ph type="dt" sz="half" idx="2"/>
-          </p:nvPr>
-        </p:nvSpPr>
-        <p:spPr>
-          <a:xfrm>
-            <a:off x="457200" y="6356350"/>
-            <a:ext cx="2133600" cy="365125"/>
-          </a:xfrm>
-          <a:prstGeom prst="rect">
-            <a:avLst/>
-          </a:prstGeom>
-        </p:spPr>
-        <p:txBody>
-          <a:bodyPr vert="horz" lIns="91440" tIns="45720" rIns="91440" bIns="45720" rtlCol="0" anchor="ctr"/>
-          <a:lstStyle>
-            <a:lvl1pPr algn="l">
-              <a:defRPr sz="1200">
-                <a:solidFill>
-                  <a:schemeClr val="tx1">
-                    <a:tint val="75000"/>
-                  </a:schemeClr>
-                </a:solidFill>
-              </a:defRPr>
-            </a:lvl1pPr>
-          </a:lstStyle>
-          <a:p>
-            <a:fld id="{FC0BB165-67B2-486D-B3F5-D61F26111002}" type="datetimeFigureOut">
-              <a:rPr lang="ko-KR" altLang="en-US" smtClean="0"/>
-              <a:t>2015-10-19</a:t>
-            </a:fld>
-            <a:endParaRPr lang="ko-KR" altLang="en-US"/>
-          </a:p>
-        </p:txBody>
-      </p:sp>
-      <p:sp>
-        <p:nvSpPr>
-          <p:cNvPr id="5" name="바닥글 개체 틀 4"/>
-          <p:cNvSpPr>
-            <a:spLocks noGrp="1"/>
-          </p:cNvSpPr>
-          <p:nvPr>
-            <p:ph type="ftr" sz="quarter" idx="3"/>
-          </p:nvPr>
-        </p:nvSpPr>
-        <p:spPr>
-          <a:xfrm>
-            <a:off x="3124200" y="6356350"/>
-            <a:ext cx="2895600" cy="365125"/>
-          </a:xfrm>
-          <a:prstGeom prst="rect">
-            <a:avLst/>
-          </a:prstGeom>
-        </p:spPr>
-        <p:txBody>
-          <a:bodyPr vert="horz" lIns="91440" tIns="45720" rIns="91440" bIns="45720" rtlCol="0" anchor="ctr"/>
-          <a:lstStyle>
-            <a:lvl1pPr algn="ctr">
-              <a:defRPr sz="1200">
-                <a:solidFill>
-                  <a:schemeClr val="tx1">
-                    <a:tint val="75000"/>
-                  </a:schemeClr>
-                </a:solidFill>
-              </a:defRPr>
-            </a:lvl1pPr>
-          </a:lstStyle>
-          <a:p>
-            <a:endParaRPr lang="ko-KR" altLang="en-US"/>
-          </a:p>
-        </p:txBody>
-      </p:sp>
-      <p:sp>
-        <p:nvSpPr>
-          <p:cNvPr id="6" name="슬라이드 번호 개체 틀 5"/>
-          <p:cNvSpPr>
-            <a:spLocks noGrp="1"/>
-          </p:cNvSpPr>
-          <p:nvPr>
-            <p:ph type="sldNum" sz="quarter" idx="4"/>
-          </p:nvPr>
-        </p:nvSpPr>
-        <p:spPr>
-          <a:xfrm>
-            <a:off x="6553200" y="6356350"/>
-            <a:ext cx="2133600" cy="365125"/>
-          </a:xfrm>
-          <a:prstGeom prst="rect">
-            <a:avLst/>
-          </a:prstGeom>
-        </p:spPr>
-        <p:txBody>
-          <a:bodyPr vert="horz" lIns="91440" tIns="45720" rIns="91440" bIns="45720" rtlCol="0" anchor="ctr"/>
-          <a:lstStyle>
-            <a:lvl1pPr algn="r">
-              <a:defRPr sz="1200">
-                <a:solidFill>
-                  <a:schemeClr val="tx1">
-                    <a:tint val="75000"/>
-                  </a:schemeClr>
-                </a:solidFill>
-              </a:defRPr>
-            </a:lvl1pPr>
-          </a:lstStyle>
-          <a:p>
-            <a:fld id="{918A2AD5-0C1D-4E54-9AD7-906D6635C1ED}" type="slidenum">
-              <a:rPr lang="ko-KR" altLang="en-US" smtClean="0"/>
-              <a:t>‹#›</a:t>
-            </a:fld>
-            <a:endParaRPr lang="ko-KR" altLang="en-US"/>
-          </a:p>
-        </p:txBody>
-      </p:sp>
     </p:spTree>
     <p:extLst>
       <p:ext uri="{BB962C8B-B14F-4D97-AF65-F5344CB8AC3E}">
@@ -3113,50 +2929,392 @@
       </p:grpSpPr>
       <p:sp>
         <p:nvSpPr>
-          <p:cNvPr id="8" name="제목 7"/>
-          <p:cNvSpPr>
-            <a:spLocks noGrp="1"/>
+          <p:cNvPr id="4" name="제목 1"/>
+          <p:cNvSpPr txBox="1">
+            <a:spLocks/>
           </p:cNvSpPr>
-          <p:nvPr>
-            <p:ph type="ctrTitle"/>
-          </p:nvPr>
-        </p:nvSpPr>
-        <p:spPr/>
-        <p:txBody>
-          <a:bodyPr/>
+          <p:nvPr/>
+        </p:nvSpPr>
+        <p:spPr>
+          <a:xfrm>
+            <a:off x="685800" y="3212977"/>
+            <a:ext cx="7772400" cy="792088"/>
+          </a:xfrm>
+          <a:prstGeom prst="rect">
+            <a:avLst/>
+          </a:prstGeom>
+        </p:spPr>
+        <p:txBody>
+          <a:bodyPr>
+            <a:normAutofit fontScale="92500" lnSpcReduction="20000"/>
+          </a:bodyPr>
+          <a:lstStyle>
+            <a:lvl1pPr algn="ctr" defTabSz="914400" rtl="0" eaLnBrk="1" latinLnBrk="1" hangingPunct="1">
+              <a:spcBef>
+                <a:spcPct val="0"/>
+              </a:spcBef>
+              <a:buNone/>
+              <a:defRPr sz="4400" kern="1200">
+                <a:solidFill>
+                  <a:schemeClr val="tx1"/>
+                </a:solidFill>
+                <a:latin typeface="+mj-lt"/>
+                <a:ea typeface="+mj-ea"/>
+                <a:cs typeface="+mj-cs"/>
+              </a:defRPr>
+            </a:lvl1pPr>
+          </a:lstStyle>
+          <a:p>
+            <a:r>
+              <a:rPr lang="en-US" altLang="ko-KR" sz="3600" dirty="0" smtClean="0"/>
+              <a:t>Developer Guide</a:t>
+            </a:r>
+          </a:p>
+          <a:p>
+            <a:r>
+              <a:rPr lang="en-US" altLang="ko-KR" sz="2200" dirty="0" smtClean="0"/>
+              <a:t>(</a:t>
+            </a:r>
+            <a:r>
+              <a:rPr lang="ko-KR" altLang="en-US" sz="2200" dirty="0" smtClean="0"/>
+              <a:t>개발환경 설정 가이드</a:t>
+            </a:r>
+            <a:r>
+              <a:rPr lang="en-US" altLang="ko-KR" sz="2200" dirty="0" smtClean="0"/>
+              <a:t>)</a:t>
+            </a:r>
+            <a:endParaRPr lang="ko-KR" altLang="en-US" sz="2200" dirty="0"/>
+          </a:p>
+        </p:txBody>
+      </p:sp>
+      <p:sp>
+        <p:nvSpPr>
+          <p:cNvPr id="5" name="부제목 2"/>
+          <p:cNvSpPr txBox="1">
+            <a:spLocks/>
+          </p:cNvSpPr>
+          <p:nvPr/>
+        </p:nvSpPr>
+        <p:spPr>
+          <a:xfrm>
+            <a:off x="1371600" y="1556792"/>
+            <a:ext cx="6400800" cy="1752600"/>
+          </a:xfrm>
+          <a:prstGeom prst="rect">
+            <a:avLst/>
+          </a:prstGeom>
+        </p:spPr>
+        <p:txBody>
+          <a:bodyPr>
+            <a:normAutofit/>
+          </a:bodyPr>
+          <a:lstStyle>
+            <a:lvl1pPr marL="342900" indent="-342900" algn="l" defTabSz="914400" rtl="0" eaLnBrk="1" latinLnBrk="1" hangingPunct="1">
+              <a:spcBef>
+                <a:spcPct val="20000"/>
+              </a:spcBef>
+              <a:buFont typeface="Arial" panose="020B0604020202020204" pitchFamily="34" charset="0"/>
+              <a:buChar char="•"/>
+              <a:defRPr sz="3200" kern="1200">
+                <a:solidFill>
+                  <a:schemeClr val="tx1"/>
+                </a:solidFill>
+                <a:latin typeface="+mn-lt"/>
+                <a:ea typeface="+mn-ea"/>
+                <a:cs typeface="+mn-cs"/>
+              </a:defRPr>
+            </a:lvl1pPr>
+            <a:lvl2pPr marL="742950" indent="-285750" algn="l" defTabSz="914400" rtl="0" eaLnBrk="1" latinLnBrk="1" hangingPunct="1">
+              <a:spcBef>
+                <a:spcPct val="20000"/>
+              </a:spcBef>
+              <a:buFont typeface="Arial" panose="020B0604020202020204" pitchFamily="34" charset="0"/>
+              <a:buChar char="–"/>
+              <a:defRPr sz="2800" kern="1200">
+                <a:solidFill>
+                  <a:schemeClr val="tx1"/>
+                </a:solidFill>
+                <a:latin typeface="+mn-lt"/>
+                <a:ea typeface="+mn-ea"/>
+                <a:cs typeface="+mn-cs"/>
+              </a:defRPr>
+            </a:lvl2pPr>
+            <a:lvl3pPr marL="1143000" indent="-228600" algn="l" defTabSz="914400" rtl="0" eaLnBrk="1" latinLnBrk="1" hangingPunct="1">
+              <a:spcBef>
+                <a:spcPct val="20000"/>
+              </a:spcBef>
+              <a:buFont typeface="Arial" panose="020B0604020202020204" pitchFamily="34" charset="0"/>
+              <a:buChar char="•"/>
+              <a:defRPr sz="2400" kern="1200">
+                <a:solidFill>
+                  <a:schemeClr val="tx1"/>
+                </a:solidFill>
+                <a:latin typeface="+mn-lt"/>
+                <a:ea typeface="+mn-ea"/>
+                <a:cs typeface="+mn-cs"/>
+              </a:defRPr>
+            </a:lvl3pPr>
+            <a:lvl4pPr marL="1600200" indent="-228600" algn="l" defTabSz="914400" rtl="0" eaLnBrk="1" latinLnBrk="1" hangingPunct="1">
+              <a:spcBef>
+                <a:spcPct val="20000"/>
+              </a:spcBef>
+              <a:buFont typeface="Arial" panose="020B0604020202020204" pitchFamily="34" charset="0"/>
+              <a:buChar char="–"/>
+              <a:defRPr sz="2000" kern="1200">
+                <a:solidFill>
+                  <a:schemeClr val="tx1"/>
+                </a:solidFill>
+                <a:latin typeface="+mn-lt"/>
+                <a:ea typeface="+mn-ea"/>
+                <a:cs typeface="+mn-cs"/>
+              </a:defRPr>
+            </a:lvl4pPr>
+            <a:lvl5pPr marL="2057400" indent="-228600" algn="l" defTabSz="914400" rtl="0" eaLnBrk="1" latinLnBrk="1" hangingPunct="1">
+              <a:spcBef>
+                <a:spcPct val="20000"/>
+              </a:spcBef>
+              <a:buFont typeface="Arial" panose="020B0604020202020204" pitchFamily="34" charset="0"/>
+              <a:buChar char="»"/>
+              <a:defRPr sz="2000" kern="1200">
+                <a:solidFill>
+                  <a:schemeClr val="tx1"/>
+                </a:solidFill>
+                <a:latin typeface="+mn-lt"/>
+                <a:ea typeface="+mn-ea"/>
+                <a:cs typeface="+mn-cs"/>
+              </a:defRPr>
+            </a:lvl5pPr>
+            <a:lvl6pPr marL="2514600" indent="-228600" algn="l" defTabSz="914400" rtl="0" eaLnBrk="1" latinLnBrk="1" hangingPunct="1">
+              <a:spcBef>
+                <a:spcPct val="20000"/>
+              </a:spcBef>
+              <a:buFont typeface="Arial" panose="020B0604020202020204" pitchFamily="34" charset="0"/>
+              <a:buChar char="•"/>
+              <a:defRPr sz="2000" kern="1200">
+                <a:solidFill>
+                  <a:schemeClr val="tx1"/>
+                </a:solidFill>
+                <a:latin typeface="+mn-lt"/>
+                <a:ea typeface="+mn-ea"/>
+                <a:cs typeface="+mn-cs"/>
+              </a:defRPr>
+            </a:lvl6pPr>
+            <a:lvl7pPr marL="2971800" indent="-228600" algn="l" defTabSz="914400" rtl="0" eaLnBrk="1" latinLnBrk="1" hangingPunct="1">
+              <a:spcBef>
+                <a:spcPct val="20000"/>
+              </a:spcBef>
+              <a:buFont typeface="Arial" panose="020B0604020202020204" pitchFamily="34" charset="0"/>
+              <a:buChar char="•"/>
+              <a:defRPr sz="2000" kern="1200">
+                <a:solidFill>
+                  <a:schemeClr val="tx1"/>
+                </a:solidFill>
+                <a:latin typeface="+mn-lt"/>
+                <a:ea typeface="+mn-ea"/>
+                <a:cs typeface="+mn-cs"/>
+              </a:defRPr>
+            </a:lvl7pPr>
+            <a:lvl8pPr marL="3429000" indent="-228600" algn="l" defTabSz="914400" rtl="0" eaLnBrk="1" latinLnBrk="1" hangingPunct="1">
+              <a:spcBef>
+                <a:spcPct val="20000"/>
+              </a:spcBef>
+              <a:buFont typeface="Arial" panose="020B0604020202020204" pitchFamily="34" charset="0"/>
+              <a:buChar char="•"/>
+              <a:defRPr sz="2000" kern="1200">
+                <a:solidFill>
+                  <a:schemeClr val="tx1"/>
+                </a:solidFill>
+                <a:latin typeface="+mn-lt"/>
+                <a:ea typeface="+mn-ea"/>
+                <a:cs typeface="+mn-cs"/>
+              </a:defRPr>
+            </a:lvl8pPr>
+            <a:lvl9pPr marL="3886200" indent="-228600" algn="l" defTabSz="914400" rtl="0" eaLnBrk="1" latinLnBrk="1" hangingPunct="1">
+              <a:spcBef>
+                <a:spcPct val="20000"/>
+              </a:spcBef>
+              <a:buFont typeface="Arial" panose="020B0604020202020204" pitchFamily="34" charset="0"/>
+              <a:buChar char="•"/>
+              <a:defRPr sz="2000" kern="1200">
+                <a:solidFill>
+                  <a:schemeClr val="tx1"/>
+                </a:solidFill>
+                <a:latin typeface="+mn-lt"/>
+                <a:ea typeface="+mn-ea"/>
+                <a:cs typeface="+mn-cs"/>
+              </a:defRPr>
+            </a:lvl9pPr>
+          </a:lstStyle>
+          <a:p>
+            <a:pPr marL="0" indent="0" algn="ctr">
+              <a:buFont typeface="Arial" panose="020B0604020202020204" pitchFamily="34" charset="0"/>
+              <a:buNone/>
+            </a:pPr>
+            <a:r>
+              <a:rPr lang="en-US" altLang="ko-KR" b="1" smtClean="0">
+                <a:solidFill>
+                  <a:schemeClr val="accent1"/>
+                </a:solidFill>
+              </a:rPr>
+              <a:t>NEXCORE UML Modeler</a:t>
+            </a:r>
+          </a:p>
+          <a:p>
+            <a:pPr marL="0" indent="0" algn="ctr">
+              <a:buFont typeface="Arial" panose="020B0604020202020204" pitchFamily="34" charset="0"/>
+              <a:buNone/>
+            </a:pPr>
+            <a:r>
+              <a:rPr lang="en-US" altLang="ko-KR" sz="2400" b="1" smtClean="0">
+                <a:solidFill>
+                  <a:schemeClr val="accent1"/>
+                </a:solidFill>
+              </a:rPr>
+              <a:t>(Apache License Version)</a:t>
+            </a:r>
+            <a:endParaRPr lang="ko-KR" altLang="en-US" sz="2400" b="1" dirty="0">
+              <a:solidFill>
+                <a:schemeClr val="accent1"/>
+              </a:solidFill>
+            </a:endParaRPr>
+          </a:p>
+        </p:txBody>
+      </p:sp>
+      <p:sp>
+        <p:nvSpPr>
+          <p:cNvPr id="6" name="TextBox 5"/>
+          <p:cNvSpPr txBox="1"/>
+          <p:nvPr/>
+        </p:nvSpPr>
+        <p:spPr>
+          <a:xfrm>
+            <a:off x="7423924" y="6196662"/>
+            <a:ext cx="1455848" cy="369332"/>
+          </a:xfrm>
+          <a:prstGeom prst="rect">
+            <a:avLst/>
+          </a:prstGeom>
+          <a:noFill/>
+        </p:spPr>
+        <p:txBody>
+          <a:bodyPr wrap="none" rtlCol="0">
+            <a:spAutoFit/>
+          </a:bodyPr>
           <a:lstStyle/>
           <a:p>
             <a:r>
               <a:rPr lang="en-US" altLang="ko-KR" dirty="0" smtClean="0"/>
-              <a:t>NEXCORE UML Modeler</a:t>
+              <a:t>SK Holdings</a:t>
             </a:r>
             <a:endParaRPr lang="ko-KR" altLang="en-US" dirty="0"/>
           </a:p>
         </p:txBody>
       </p:sp>
-      <p:sp>
-        <p:nvSpPr>
-          <p:cNvPr id="9" name="부제목 8"/>
-          <p:cNvSpPr>
-            <a:spLocks noGrp="1"/>
-          </p:cNvSpPr>
-          <p:nvPr>
-            <p:ph type="subTitle" idx="1"/>
-          </p:nvPr>
-        </p:nvSpPr>
-        <p:spPr/>
-        <p:txBody>
-          <a:bodyPr/>
-          <a:lstStyle/>
-          <a:p>
-            <a:r>
-              <a:rPr lang="ko-KR" altLang="en-US" dirty="0" smtClean="0"/>
-              <a:t>개발 환경 설정 가이드</a:t>
-            </a:r>
-            <a:endParaRPr lang="ko-KR" altLang="en-US" dirty="0"/>
-          </a:p>
-        </p:txBody>
-      </p:sp>
+      <p:pic>
+        <p:nvPicPr>
+          <p:cNvPr id="10" name="Picture 2"/>
+          <p:cNvPicPr>
+            <a:picLocks noChangeAspect="1" noChangeArrowheads="1"/>
+          </p:cNvPicPr>
+          <p:nvPr/>
+        </p:nvPicPr>
+        <p:blipFill>
+          <a:blip r:embed="rId2" cstate="print">
+            <a:extLst>
+              <a:ext uri="{28A0092B-C50C-407E-A947-70E740481C1C}">
+                <a14:useLocalDpi xmlns:a14="http://schemas.microsoft.com/office/drawing/2010/main" val="0"/>
+              </a:ext>
+            </a:extLst>
+          </a:blip>
+          <a:srcRect/>
+          <a:stretch>
+            <a:fillRect/>
+          </a:stretch>
+        </p:blipFill>
+        <p:spPr bwMode="auto">
+          <a:xfrm>
+            <a:off x="7668344" y="116632"/>
+            <a:ext cx="1296144" cy="276984"/>
+          </a:xfrm>
+          <a:prstGeom prst="rect">
+            <a:avLst/>
+          </a:prstGeom>
+          <a:noFill/>
+          <a:ln>
+            <a:noFill/>
+          </a:ln>
+          <a:effectLst/>
+          <a:extLst>
+            <a:ext uri="{909E8E84-426E-40DD-AFC4-6F175D3DCCD1}">
+              <a14:hiddenFill xmlns:a14="http://schemas.microsoft.com/office/drawing/2010/main">
+                <a:solidFill>
+                  <a:schemeClr val="accent1"/>
+                </a:solidFill>
+              </a14:hiddenFill>
+            </a:ext>
+            <a:ext uri="{91240B29-F687-4F45-9708-019B960494DF}">
+              <a14:hiddenLine xmlns:a14="http://schemas.microsoft.com/office/drawing/2010/main" w="9525">
+                <a:solidFill>
+                  <a:schemeClr val="tx1"/>
+                </a:solidFill>
+                <a:miter lim="800000"/>
+                <a:headEnd/>
+                <a:tailEnd/>
+              </a14:hiddenLine>
+            </a:ext>
+            <a:ext uri="{AF507438-7753-43E0-B8FC-AC1667EBCBE1}">
+              <a14:hiddenEffects xmlns:a14="http://schemas.microsoft.com/office/drawing/2010/main">
+                <a:effectLst>
+                  <a:outerShdw dist="35921" dir="2700000" algn="ctr" rotWithShape="0">
+                    <a:schemeClr val="bg2"/>
+                  </a:outerShdw>
+                </a:effectLst>
+              </a14:hiddenEffects>
+            </a:ext>
+          </a:extLst>
+        </p:spPr>
+      </p:pic>
+      <p:pic>
+        <p:nvPicPr>
+          <p:cNvPr id="11" name="Picture 2" descr="D:\00.SK CC\04.NEXCORE\02.표준\SK합병회사 CI\SK holdings_color.png"/>
+          <p:cNvPicPr>
+            <a:picLocks noChangeAspect="1" noChangeArrowheads="1"/>
+          </p:cNvPicPr>
+          <p:nvPr/>
+        </p:nvPicPr>
+        <p:blipFill>
+          <a:blip r:embed="rId3" cstate="print">
+            <a:extLst>
+              <a:ext uri="{28A0092B-C50C-407E-A947-70E740481C1C}">
+                <a14:useLocalDpi xmlns:a14="http://schemas.microsoft.com/office/drawing/2010/main" val="0"/>
+              </a:ext>
+            </a:extLst>
+          </a:blip>
+          <a:srcRect/>
+          <a:stretch>
+            <a:fillRect/>
+          </a:stretch>
+        </p:blipFill>
+        <p:spPr bwMode="auto">
+          <a:xfrm>
+            <a:off x="179512" y="116632"/>
+            <a:ext cx="976935" cy="402890"/>
+          </a:xfrm>
+          <a:prstGeom prst="rect">
+            <a:avLst/>
+          </a:prstGeom>
+          <a:noFill/>
+          <a:extLst>
+            <a:ext uri="{909E8E84-426E-40DD-AFC4-6F175D3DCCD1}">
+              <a14:hiddenFill xmlns:a14="http://schemas.microsoft.com/office/drawing/2010/main">
+                <a:solidFill>
+                  <a:srgbClr val="FFFFFF"/>
+                </a:solidFill>
+              </a14:hiddenFill>
+            </a:ext>
+          </a:extLst>
+        </p:spPr>
+      </p:pic>
     </p:spTree>
     <p:extLst>
       <p:ext uri="{BB962C8B-B14F-4D97-AF65-F5344CB8AC3E}">
@@ -3243,7 +3401,7 @@
         <p:spPr bwMode="auto">
           <a:xfrm>
             <a:off x="539552" y="692696"/>
-            <a:ext cx="8047756" cy="6035817"/>
+            <a:ext cx="7905201" cy="5928901"/>
           </a:xfrm>
           <a:prstGeom prst="rect">
             <a:avLst/>
@@ -3629,7 +3787,7 @@
         </p:blipFill>
         <p:spPr bwMode="auto">
           <a:xfrm>
-            <a:off x="426607" y="1011138"/>
+            <a:off x="426607" y="836712"/>
             <a:ext cx="4721457" cy="4146054"/>
           </a:xfrm>
           <a:prstGeom prst="rect">
@@ -3700,7 +3858,7 @@
         </p:nvSpPr>
         <p:spPr>
           <a:xfrm>
-            <a:off x="2843808" y="4170462"/>
+            <a:off x="2843808" y="3996036"/>
             <a:ext cx="936104" cy="458291"/>
           </a:xfrm>
           <a:prstGeom prst="wedgeRoundRectCallout">
@@ -3792,7 +3950,7 @@
         </p:blipFill>
         <p:spPr bwMode="auto">
           <a:xfrm>
-            <a:off x="4427984" y="2655308"/>
+            <a:off x="4427984" y="2480882"/>
             <a:ext cx="4536504" cy="3983641"/>
           </a:xfrm>
           <a:prstGeom prst="rect">
@@ -3831,7 +3989,7 @@
         </p:nvSpPr>
         <p:spPr>
           <a:xfrm>
-            <a:off x="7236296" y="5661248"/>
+            <a:off x="7236296" y="5486822"/>
             <a:ext cx="936104" cy="458291"/>
           </a:xfrm>
           <a:prstGeom prst="wedgeRoundRectCallout">
@@ -3986,7 +4144,7 @@
         <p:spPr bwMode="auto">
           <a:xfrm>
             <a:off x="467544" y="620688"/>
-            <a:ext cx="8064896" cy="6048672"/>
+            <a:ext cx="7921969" cy="5941477"/>
           </a:xfrm>
           <a:prstGeom prst="rect">
             <a:avLst/>
@@ -4123,7 +4281,7 @@
         </p:blipFill>
         <p:spPr bwMode="auto">
           <a:xfrm>
-            <a:off x="4075944" y="2132856"/>
+            <a:off x="4075944" y="1844824"/>
             <a:ext cx="4970151" cy="4725144"/>
           </a:xfrm>
           <a:prstGeom prst="rect">
@@ -4162,7 +4320,7 @@
         </p:nvSpPr>
         <p:spPr>
           <a:xfrm>
-            <a:off x="6408204" y="4499198"/>
+            <a:off x="6408204" y="4211166"/>
             <a:ext cx="792088" cy="458291"/>
           </a:xfrm>
           <a:prstGeom prst="wedgeRoundRectCallout">
@@ -4238,7 +4396,7 @@
         </p:nvSpPr>
         <p:spPr>
           <a:xfrm>
-            <a:off x="6164560" y="3162647"/>
+            <a:off x="6164560" y="2874615"/>
             <a:ext cx="792088" cy="458291"/>
           </a:xfrm>
           <a:prstGeom prst="wedgeRoundRectCallout">
@@ -4314,7 +4472,7 @@
         </p:nvSpPr>
         <p:spPr>
           <a:xfrm>
-            <a:off x="6851265" y="5733256"/>
+            <a:off x="6851265" y="5445224"/>
             <a:ext cx="792088" cy="458291"/>
           </a:xfrm>
           <a:prstGeom prst="wedgeRoundRectCallout">
@@ -4627,7 +4785,7 @@
         </p:blipFill>
         <p:spPr bwMode="auto">
           <a:xfrm>
-            <a:off x="395536" y="692696"/>
+            <a:off x="395536" y="571672"/>
             <a:ext cx="7992888" cy="5994666"/>
           </a:xfrm>
           <a:prstGeom prst="rect">
@@ -4698,7 +4856,7 @@
         </p:nvSpPr>
         <p:spPr>
           <a:xfrm>
-            <a:off x="755576" y="2996952"/>
+            <a:off x="755576" y="2875928"/>
             <a:ext cx="2304256" cy="3240360"/>
           </a:xfrm>
           <a:prstGeom prst="wedgeRoundRectCallout">
@@ -4756,7 +4914,7 @@
         </p:nvSpPr>
         <p:spPr>
           <a:xfrm>
-            <a:off x="3592463" y="2348880"/>
+            <a:off x="3592463" y="2227856"/>
             <a:ext cx="2448272" cy="1008112"/>
           </a:xfrm>
           <a:prstGeom prst="roundRect">
@@ -4888,7 +5046,7 @@
         </p:blipFill>
         <p:spPr bwMode="auto">
           <a:xfrm>
-            <a:off x="539552" y="674694"/>
+            <a:off x="552999" y="553670"/>
             <a:ext cx="7992888" cy="5994666"/>
           </a:xfrm>
           <a:prstGeom prst="rect">
@@ -4964,7 +5122,7 @@
         </p:nvSpPr>
         <p:spPr>
           <a:xfrm>
-            <a:off x="555204" y="1628800"/>
+            <a:off x="568651" y="1507776"/>
             <a:ext cx="2072580" cy="3384376"/>
           </a:xfrm>
           <a:prstGeom prst="wedgeRoundRectCallout">
@@ -5022,7 +5180,7 @@
         </p:nvSpPr>
         <p:spPr>
           <a:xfrm>
-            <a:off x="2843808" y="1268760"/>
+            <a:off x="2857255" y="1147736"/>
             <a:ext cx="3456384" cy="1224136"/>
           </a:xfrm>
           <a:prstGeom prst="roundRect">
@@ -5155,7 +5313,7 @@
         </p:blipFill>
         <p:spPr bwMode="auto">
           <a:xfrm>
-            <a:off x="4067944" y="2623592"/>
+            <a:off x="4054497" y="2408439"/>
             <a:ext cx="4740573" cy="4159117"/>
           </a:xfrm>
           <a:prstGeom prst="rect">
@@ -5194,7 +5352,7 @@
         </p:nvSpPr>
         <p:spPr>
           <a:xfrm>
-            <a:off x="4103948" y="3442881"/>
+            <a:off x="4090501" y="3227728"/>
             <a:ext cx="936104" cy="458291"/>
           </a:xfrm>
           <a:prstGeom prst="wedgeRoundRectCallout">
@@ -5271,7 +5429,7 @@
         </p:nvSpPr>
         <p:spPr>
           <a:xfrm>
-            <a:off x="6732240" y="5805264"/>
+            <a:off x="6718793" y="5590111"/>
             <a:ext cx="936104" cy="458291"/>
           </a:xfrm>
           <a:prstGeom prst="wedgeRoundRectCallout">
@@ -5393,7 +5551,7 @@
         </p:blipFill>
         <p:spPr bwMode="auto">
           <a:xfrm>
-            <a:off x="539552" y="674694"/>
+            <a:off x="526105" y="594012"/>
             <a:ext cx="7992888" cy="5994666"/>
           </a:xfrm>
           <a:prstGeom prst="rect">
@@ -5447,7 +5605,7 @@
         </p:blipFill>
         <p:spPr bwMode="auto">
           <a:xfrm>
-            <a:off x="4227562" y="1786560"/>
+            <a:off x="4214115" y="1705878"/>
             <a:ext cx="4431681" cy="3770933"/>
           </a:xfrm>
           <a:prstGeom prst="rect">
@@ -5523,7 +5681,7 @@
         </p:nvSpPr>
         <p:spPr>
           <a:xfrm>
-            <a:off x="1187624" y="1628800"/>
+            <a:off x="1174177" y="1548118"/>
             <a:ext cx="3024336" cy="936104"/>
           </a:xfrm>
           <a:prstGeom prst="roundRect">
@@ -5592,7 +5750,7 @@
         </p:nvSpPr>
         <p:spPr>
           <a:xfrm>
-            <a:off x="4139952" y="4077072"/>
+            <a:off x="4126505" y="3996390"/>
             <a:ext cx="1404156" cy="458291"/>
           </a:xfrm>
           <a:prstGeom prst="wedgeRoundRectCallout">
@@ -5669,7 +5827,7 @@
         </p:nvSpPr>
         <p:spPr>
           <a:xfrm>
-            <a:off x="6732240" y="5805264"/>
+            <a:off x="6718793" y="5724582"/>
             <a:ext cx="936104" cy="458291"/>
           </a:xfrm>
           <a:prstGeom prst="wedgeRoundRectCallout">
@@ -5820,7 +5978,7 @@
         </p:blipFill>
         <p:spPr bwMode="auto">
           <a:xfrm>
-            <a:off x="467544" y="715797"/>
+            <a:off x="467544" y="581326"/>
             <a:ext cx="8316417" cy="6025571"/>
           </a:xfrm>
           <a:prstGeom prst="rect">
@@ -5855,6 +6013,67 @@
     <p:extLst>
       <p:ext uri="{BB962C8B-B14F-4D97-AF65-F5344CB8AC3E}">
         <p14:creationId xmlns:p14="http://schemas.microsoft.com/office/powerpoint/2010/main" val="2428673348"/>
+      </p:ext>
+    </p:extLst>
+  </p:cSld>
+  <p:clrMapOvr>
+    <a:masterClrMapping/>
+  </p:clrMapOvr>
+</p:sld>
+</file>
+
+<file path=ppt/slides/slide18.xml><?xml version="1.0" encoding="utf-8"?>
+<p:sld xmlns:a="http://schemas.openxmlformats.org/drawingml/2006/main" xmlns:r="http://schemas.openxmlformats.org/officeDocument/2006/relationships" xmlns:p="http://schemas.openxmlformats.org/presentationml/2006/main">
+  <p:cSld>
+    <p:spTree>
+      <p:nvGrpSpPr>
+        <p:cNvPr id="1" name=""/>
+        <p:cNvGrpSpPr/>
+        <p:nvPr/>
+      </p:nvGrpSpPr>
+      <p:grpSpPr>
+        <a:xfrm>
+          <a:off x="0" y="0"/>
+          <a:ext cx="0" cy="0"/>
+          <a:chOff x="0" y="0"/>
+          <a:chExt cx="0" cy="0"/>
+        </a:xfrm>
+      </p:grpSpPr>
+      <p:sp>
+        <p:nvSpPr>
+          <p:cNvPr id="2" name="TextBox 1"/>
+          <p:cNvSpPr txBox="1"/>
+          <p:nvPr/>
+        </p:nvSpPr>
+        <p:spPr>
+          <a:xfrm>
+            <a:off x="0" y="2708920"/>
+            <a:ext cx="9144000" cy="769441"/>
+          </a:xfrm>
+          <a:prstGeom prst="rect">
+            <a:avLst/>
+          </a:prstGeom>
+          <a:noFill/>
+        </p:spPr>
+        <p:txBody>
+          <a:bodyPr wrap="square" rtlCol="0">
+            <a:spAutoFit/>
+          </a:bodyPr>
+          <a:lstStyle/>
+          <a:p>
+            <a:pPr algn="ctr"/>
+            <a:r>
+              <a:rPr lang="en-US" altLang="ko-KR" sz="4400" dirty="0" smtClean="0"/>
+              <a:t>E.O.D</a:t>
+            </a:r>
+            <a:endParaRPr lang="ko-KR" altLang="en-US" sz="4400" dirty="0"/>
+          </a:p>
+        </p:txBody>
+      </p:sp>
+    </p:spTree>
+    <p:extLst>
+      <p:ext uri="{BB962C8B-B14F-4D97-AF65-F5344CB8AC3E}">
+        <p14:creationId xmlns:p14="http://schemas.microsoft.com/office/powerpoint/2010/main" val="1620491491"/>
       </p:ext>
     </p:extLst>
   </p:cSld>
@@ -7415,8 +7634,8 @@
         </p:blipFill>
         <p:spPr bwMode="auto">
           <a:xfrm>
-            <a:off x="1704306" y="744183"/>
-            <a:ext cx="6377657" cy="5970941"/>
+            <a:off x="1704307" y="744183"/>
+            <a:ext cx="6252070" cy="5853363"/>
           </a:xfrm>
           <a:prstGeom prst="rect">
             <a:avLst/>
@@ -8113,7 +8332,7 @@
         <p:spPr bwMode="auto">
           <a:xfrm>
             <a:off x="611560" y="662633"/>
-            <a:ext cx="7992888" cy="5994666"/>
+            <a:ext cx="7830184" cy="5872638"/>
           </a:xfrm>
           <a:prstGeom prst="rect">
             <a:avLst/>

</xml_diff>